<commit_message>
added qps, ppts, tp solved and other resources
</commit_message>
<xml_diff>
--- a/03. Computer Networks/PPTs/2.3. MAC.pptx
+++ b/03. Computer Networks/PPTs/2.3. MAC.pptx
@@ -250,7 +250,7 @@
           <a:p>
             <a:fld id="{4EE04660-50B5-49E2-86C4-95AD9D2CC507}" type="datetimeFigureOut">
               <a:rPr lang="en-US" smtClean="0"/>
-              <a:t>2/24/2020</a:t>
+              <a:t>3/3/2020</a:t>
             </a:fld>
             <a:endParaRPr lang="en-US"/>
           </a:p>
@@ -2892,7 +2892,7 @@
             <a:fld id="{1D8BD707-D9CF-40AE-B4C6-C98DA3205C09}" type="datetimeFigureOut">
               <a:rPr lang="en-US" smtClean="0"/>
               <a:pPr/>
-              <a:t>2/24/2020</a:t>
+              <a:t>3/3/2020</a:t>
             </a:fld>
             <a:endParaRPr lang="en-US"/>
           </a:p>
@@ -3285,7 +3285,7 @@
             <a:fld id="{1D8BD707-D9CF-40AE-B4C6-C98DA3205C09}" type="datetimeFigureOut">
               <a:rPr lang="en-US" smtClean="0"/>
               <a:pPr/>
-              <a:t>2/24/2020</a:t>
+              <a:t>3/3/2020</a:t>
             </a:fld>
             <a:endParaRPr lang="en-US"/>
           </a:p>
@@ -3820,7 +3820,7 @@
             <a:fld id="{1D8BD707-D9CF-40AE-B4C6-C98DA3205C09}" type="datetimeFigureOut">
               <a:rPr lang="en-US" smtClean="0"/>
               <a:pPr/>
-              <a:t>2/24/2020</a:t>
+              <a:t>3/3/2020</a:t>
             </a:fld>
             <a:endParaRPr lang="en-US"/>
           </a:p>
@@ -3952,7 +3952,7 @@
             <a:fld id="{1D8BD707-D9CF-40AE-B4C6-C98DA3205C09}" type="datetimeFigureOut">
               <a:rPr lang="en-US" smtClean="0"/>
               <a:pPr/>
-              <a:t>2/24/2020</a:t>
+              <a:t>3/3/2020</a:t>
             </a:fld>
             <a:endParaRPr lang="en-US"/>
           </a:p>
@@ -4497,7 +4497,7 @@
             <a:fld id="{1D8BD707-D9CF-40AE-B4C6-C98DA3205C09}" type="datetimeFigureOut">
               <a:rPr lang="en-US" smtClean="0"/>
               <a:pPr/>
-              <a:t>2/24/2020</a:t>
+              <a:t>3/3/2020</a:t>
             </a:fld>
             <a:endParaRPr lang="en-US"/>
           </a:p>
@@ -4792,7 +4792,7 @@
             <a:fld id="{1D8BD707-D9CF-40AE-B4C6-C98DA3205C09}" type="datetimeFigureOut">
               <a:rPr lang="en-US" smtClean="0"/>
               <a:pPr/>
-              <a:t>2/24/2020</a:t>
+              <a:t>3/3/2020</a:t>
             </a:fld>
             <a:endParaRPr lang="en-US"/>
           </a:p>
@@ -5453,7 +5453,7 @@
             <a:fld id="{1D8BD707-D9CF-40AE-B4C6-C98DA3205C09}" type="datetimeFigureOut">
               <a:rPr lang="en-US" smtClean="0"/>
               <a:pPr/>
-              <a:t>2/24/2020</a:t>
+              <a:t>3/3/2020</a:t>
             </a:fld>
             <a:endParaRPr lang="en-US"/>
           </a:p>
@@ -5889,7 +5889,7 @@
             <a:fld id="{1D8BD707-D9CF-40AE-B4C6-C98DA3205C09}" type="datetimeFigureOut">
               <a:rPr lang="en-US" smtClean="0"/>
               <a:pPr/>
-              <a:t>2/24/2020</a:t>
+              <a:t>3/3/2020</a:t>
             </a:fld>
             <a:endParaRPr lang="en-US"/>
           </a:p>
@@ -6204,7 +6204,7 @@
             <a:fld id="{1D8BD707-D9CF-40AE-B4C6-C98DA3205C09}" type="datetimeFigureOut">
               <a:rPr lang="en-US" smtClean="0"/>
               <a:pPr/>
-              <a:t>2/24/2020</a:t>
+              <a:t>3/3/2020</a:t>
             </a:fld>
             <a:endParaRPr lang="en-US"/>
           </a:p>
@@ -6938,7 +6938,7 @@
             <a:fld id="{1D8BD707-D9CF-40AE-B4C6-C98DA3205C09}" type="datetimeFigureOut">
               <a:rPr lang="en-US" smtClean="0"/>
               <a:pPr/>
-              <a:t>2/24/2020</a:t>
+              <a:t>3/3/2020</a:t>
             </a:fld>
             <a:endParaRPr lang="en-US"/>
           </a:p>
@@ -7603,7 +7603,7 @@
             <a:fld id="{1D8BD707-D9CF-40AE-B4C6-C98DA3205C09}" type="datetimeFigureOut">
               <a:rPr lang="en-US" smtClean="0"/>
               <a:pPr/>
-              <a:t>2/24/2020</a:t>
+              <a:t>3/3/2020</a:t>
             </a:fld>
             <a:endParaRPr lang="en-US"/>
           </a:p>
@@ -7877,7 +7877,7 @@
             <a:fld id="{1D8BD707-D9CF-40AE-B4C6-C98DA3205C09}" type="datetimeFigureOut">
               <a:rPr lang="en-US" smtClean="0"/>
               <a:pPr/>
-              <a:t>2/24/2020</a:t>
+              <a:t>3/3/2020</a:t>
             </a:fld>
             <a:endParaRPr lang="en-US"/>
           </a:p>
@@ -9200,7 +9200,7 @@
           <a:p>
             <a:r>
               <a:rPr lang="en-US" altLang="en-US" sz="2400" b="1" dirty="0"/>
-              <a:t>Carrier Sense Multiple Access(</a:t>
+              <a:t>Carrier Sense Multiple Access (</a:t>
             </a:r>
             <a:r>
               <a:rPr lang="en-US" altLang="en-US" sz="2400" dirty="0"/>
@@ -9223,7 +9223,7 @@
         <p:spPr>
           <a:xfrm>
             <a:off x="166984" y="1066800"/>
-            <a:ext cx="8977016" cy="4154984"/>
+            <a:ext cx="8977016" cy="3785652"/>
           </a:xfrm>
           <a:prstGeom prst="rect">
             <a:avLst/>
@@ -9275,7 +9275,27 @@
             </a:pPr>
             <a:r>
               <a:rPr lang="en-US" altLang="en-US" sz="2400" dirty="0"/>
-              <a:t>Listen to channel. If busy then wait for a random time and then listen again.</a:t>
+              <a:t>Listen to channel. </a:t>
+            </a:r>
+          </a:p>
+          <a:p>
+            <a:pPr marL="800100" lvl="1" indent="-342900">
+              <a:buFont typeface="Arial" panose="020B0604020202020204" pitchFamily="34" charset="0"/>
+              <a:buChar char="•"/>
+            </a:pPr>
+            <a:r>
+              <a:rPr lang="en-US" altLang="en-US" sz="2400" dirty="0"/>
+              <a:t>If busy then wait for a random time and then listen again.</a:t>
+            </a:r>
+          </a:p>
+          <a:p>
+            <a:pPr marL="800100" lvl="1" indent="-342900">
+              <a:buFont typeface="Arial" panose="020B0604020202020204" pitchFamily="34" charset="0"/>
+              <a:buChar char="•"/>
+            </a:pPr>
+            <a:r>
+              <a:rPr lang="en-US" altLang="en-US" sz="2400" dirty="0"/>
+              <a:t>If not busy then transmit.</a:t>
             </a:r>
           </a:p>
           <a:p>
@@ -9292,28 +9312,7 @@
             </a:pPr>
             <a:r>
               <a:rPr lang="en-US" altLang="en-US" sz="2400" dirty="0"/>
-              <a:t>  If not busy then </a:t>
-            </a:r>
-            <a:r>
-              <a:rPr lang="en-US" altLang="en-US" sz="2400"/>
-              <a:t>transmit.</a:t>
-            </a:r>
-          </a:p>
-          <a:p>
-            <a:pPr marL="342900" indent="-342900">
-              <a:buFont typeface="Arial" panose="020B0604020202020204" pitchFamily="34" charset="0"/>
-              <a:buChar char="•"/>
-            </a:pPr>
-            <a:endParaRPr lang="en-US" altLang="en-US" sz="2400" dirty="0"/>
-          </a:p>
-          <a:p>
-            <a:pPr marL="342900" indent="-342900">
-              <a:buFont typeface="Arial" panose="020B0604020202020204" pitchFamily="34" charset="0"/>
-              <a:buChar char="•"/>
-            </a:pPr>
-            <a:r>
-              <a:rPr lang="en-US" altLang="en-US" sz="2400" dirty="0"/>
-              <a:t>Collision may still happen</a:t>
+              <a:t>Collision may still happen. </a:t>
             </a:r>
           </a:p>
         </p:txBody>
@@ -9982,7 +9981,7 @@
             </a:pPr>
             <a:r>
               <a:rPr lang="en-US" sz="2400" dirty="0"/>
-              <a:t>This method has highest chance of collision</a:t>
+              <a:t>This method has highest chance of collision. </a:t>
             </a:r>
           </a:p>
           <a:p>
@@ -9991,12 +9990,8 @@
               <a:buChar char="•"/>
             </a:pPr>
             <a:r>
-              <a:rPr lang="en-US" sz="2400" dirty="0" err="1"/>
-              <a:t>Becoz</a:t>
-            </a:r>
-            <a:r>
               <a:rPr lang="en-US" sz="2400" dirty="0"/>
-              <a:t> 2 or more station may find the line idle and send their frame immediately  </a:t>
+              <a:t>Because 2 or more station may find the line idle and send their frame immediately. </a:t>
             </a:r>
           </a:p>
           <a:p>
@@ -10099,23 +10094,23 @@
             </a:r>
           </a:p>
           <a:p>
-            <a:pPr marL="285750" indent="-285750">
+            <a:pPr marL="742950" lvl="1" indent="-285750">
               <a:buFont typeface="Arial" panose="020B0604020202020204" pitchFamily="34" charset="0"/>
               <a:buChar char="•"/>
             </a:pPr>
             <a:r>
               <a:rPr lang="en-US" sz="2400" dirty="0"/>
-              <a:t>If  line idle, it sends immediately</a:t>
-            </a:r>
-          </a:p>
-          <a:p>
-            <a:pPr marL="285750" indent="-285750">
+              <a:t>If line idle, it sends immediately</a:t>
+            </a:r>
+          </a:p>
+          <a:p>
+            <a:pPr marL="742950" lvl="1" indent="-285750">
               <a:buFont typeface="Arial" panose="020B0604020202020204" pitchFamily="34" charset="0"/>
               <a:buChar char="•"/>
             </a:pPr>
             <a:r>
               <a:rPr lang="en-US" sz="2400" dirty="0"/>
-              <a:t>If  busy, it waits a random amount of time and then senses the line again </a:t>
+              <a:t>If busy, it waits a random amount of time and then senses the line again </a:t>
             </a:r>
           </a:p>
           <a:p>
@@ -10241,7 +10236,7 @@
             </a:pPr>
             <a:r>
               <a:rPr lang="en-US" sz="2400" dirty="0"/>
-              <a:t>Reduces chance of collision  and improves efficiency.</a:t>
+              <a:t>Reduces chance of collision and improves efficiency.</a:t>
             </a:r>
           </a:p>
           <a:p>
@@ -10275,7 +10270,7 @@
             </a:pPr>
             <a:r>
               <a:rPr lang="en-US" sz="2400" dirty="0"/>
-              <a:t> Since, it sends with a probability p, the name p – persistent CSMA is given.</a:t>
+              <a:t> Since it sends with a probability p, the name p – persistent CSMA is given.</a:t>
             </a:r>
           </a:p>
         </p:txBody>
@@ -10319,7 +10314,7 @@
         <p:spPr>
           <a:xfrm>
             <a:off x="152400" y="152400"/>
-            <a:ext cx="8763000" cy="7478970"/>
+            <a:ext cx="8763000" cy="6001643"/>
           </a:xfrm>
           <a:prstGeom prst="rect">
             <a:avLst/>
@@ -10378,7 +10373,7 @@
             </a:pPr>
             <a:r>
               <a:rPr lang="en-US" sz="2400" dirty="0"/>
-              <a:t>With a probability ( 1 – p ), the channel waits for next time slot. If the next time slot is idle, it again transmits with a probability p and waits with a probability        ( 1 – p ).</a:t>
+              <a:t>With a probability ( 1 – p ), the channel waits for next time slot. If the next time slot is idle, it again transmits with a probability p and waits with a probability ( 1 – p ).</a:t>
             </a:r>
           </a:p>
           <a:p>
@@ -10412,36 +10407,8 @@
             </a:pPr>
             <a:r>
               <a:rPr lang="en-US" sz="2400" dirty="0"/>
-              <a:t>If another station begins transmitting, the station waits for a random amount of time.(back off algorithm)  and restarts the algorithm.</a:t>
-            </a:r>
-          </a:p>
-          <a:p>
-            <a:pPr marL="285750" indent="-285750">
-              <a:buFont typeface="Arial" panose="020B0604020202020204" pitchFamily="34" charset="0"/>
-              <a:buChar char="•"/>
-            </a:pPr>
-            <a:endParaRPr lang="en-US" sz="2400" dirty="0"/>
-          </a:p>
-          <a:p>
-            <a:pPr marL="285750" indent="-285750">
-              <a:buFont typeface="Arial" panose="020B0604020202020204" pitchFamily="34" charset="0"/>
-              <a:buChar char="•"/>
-            </a:pPr>
-            <a:endParaRPr lang="en-US" sz="2400" dirty="0"/>
-          </a:p>
-          <a:p>
-            <a:pPr marL="285750" indent="-285750">
-              <a:buFont typeface="Arial" panose="020B0604020202020204" pitchFamily="34" charset="0"/>
-              <a:buChar char="•"/>
-            </a:pPr>
-            <a:endParaRPr lang="en-US" sz="2400" u="sng" dirty="0"/>
-          </a:p>
-          <a:p>
-            <a:pPr marL="285750" indent="-285750">
-              <a:buFont typeface="Arial" panose="020B0604020202020204" pitchFamily="34" charset="0"/>
-              <a:buChar char="•"/>
-            </a:pPr>
-            <a:endParaRPr lang="en-US" sz="2400" dirty="0"/>
+              <a:t>If another station begins transmitting, the station waits for a random amount of time (back off algorithm) and restarts the algorithm.</a:t>
+            </a:r>
           </a:p>
         </p:txBody>
       </p:sp>
@@ -14119,7 +14086,7 @@
         <p:spPr bwMode="auto">
           <a:xfrm>
             <a:off x="1143000" y="609600"/>
-            <a:ext cx="7848600" cy="5632311"/>
+            <a:ext cx="7848600" cy="5016758"/>
           </a:xfrm>
           <a:prstGeom prst="rect">
             <a:avLst/>
@@ -14344,7 +14311,7 @@
                   <a:schemeClr val="tx1"/>
                 </a:solidFill>
               </a:rPr>
-              <a:t> -	Carrier Sense – the ability of a network card to </a:t>
+              <a:t>- Carrier Sense – the ability of a network card to </a:t>
             </a:r>
             <a:r>
               <a:rPr lang="en-US" altLang="en-US" sz="2000" i="1" dirty="0">
@@ -14375,7 +14342,7 @@
                   <a:schemeClr val="tx1"/>
                 </a:solidFill>
               </a:rPr>
-              <a:t>   -	Multiple Access – states that in that network there are multiple stations that could access the network at the same time</a:t>
+              <a:t>- Multiple Access – states that in that network there are multiple stations that could access the network at the same time</a:t>
             </a:r>
           </a:p>
           <a:p>
@@ -14397,7 +14364,7 @@
                   <a:schemeClr val="tx1"/>
                 </a:solidFill>
               </a:rPr>
-              <a:t>   -	Collision Detection – the method needed for detecting a collision</a:t>
+              <a:t>- Collision Detection – the method needed for detecting a collision</a:t>
             </a:r>
           </a:p>
           <a:p>
@@ -14480,21 +14447,6 @@
                 </a:solidFill>
               </a:rPr>
               <a:t> describes how the Ethernet protocol regulates communication among nodes</a:t>
-            </a:r>
-          </a:p>
-          <a:p>
-            <a:pPr algn="just" eaLnBrk="1" hangingPunct="1">
-              <a:lnSpc>
-                <a:spcPct val="100000"/>
-              </a:lnSpc>
-            </a:pPr>
-            <a:r>
-              <a:rPr lang="en-US" altLang="en-US" sz="2000" dirty="0">
-                <a:solidFill>
-                  <a:schemeClr val="tx1"/>
-                </a:solidFill>
-              </a:rPr>
-              <a:t>  </a:t>
             </a:r>
           </a:p>
         </p:txBody>
@@ -16864,7 +16816,7 @@
             </a:pPr>
             <a:r>
               <a:rPr lang="en-US" sz="2400" dirty="0"/>
-              <a:t>A station is ready to send, chooses a random number  of slots  as its wait time.</a:t>
+              <a:t>A station is ready to send, chooses a random number of slots as its wait time.</a:t>
             </a:r>
           </a:p>
           <a:p>
@@ -16881,7 +16833,7 @@
             </a:pPr>
             <a:r>
               <a:rPr lang="en-US" sz="2400" dirty="0"/>
-              <a:t>The number of slots in the window changes according to the binary exponential  back of strategy.</a:t>
+              <a:t>The number of slots in the window changes according to the binary exponential back off strategy.</a:t>
             </a:r>
           </a:p>
           <a:p>
@@ -16898,7 +16850,7 @@
             </a:pPr>
             <a:r>
               <a:rPr lang="en-US" sz="2400" dirty="0"/>
-              <a:t>It is set to one slot the first time and then doubles  each time the station cannot detect an idle channel  after the IFS time. </a:t>
+              <a:t>It is set to one slot the first time and then doubles each time the station cannot detect an idle channel after the IFS time. </a:t>
             </a:r>
           </a:p>
         </p:txBody>
@@ -16990,7 +16942,7 @@
             </a:pPr>
             <a:r>
               <a:rPr lang="en-US" sz="2400" dirty="0"/>
-              <a:t>With all these precaution ,there still may be collision resulting in destroying data.</a:t>
+              <a:t>With all these precaution, there still may be collision resulting in destroying data.</a:t>
             </a:r>
           </a:p>
           <a:p>
@@ -17010,7 +16962,7 @@
             </a:pPr>
             <a:r>
               <a:rPr lang="en-US" sz="2400" dirty="0"/>
-              <a:t>The positive acknowledgement and timeout timer  can help guarantee that the receiver has received the frame. </a:t>
+              <a:t>The positive acknowledgement and timeout timer can help guarantee that the receiver has received the frame. </a:t>
             </a:r>
           </a:p>
           <a:p>
@@ -17512,8 +17464,37 @@
           <a:p>
             <a:r>
               <a:rPr lang="en-US" dirty="0"/>
-              <a:t>When nodes or stations are connected and use a common link ,called a multipoint or broadcast link , we need multiple access  protocol to coordinate access to the link .</a:t>
-            </a:r>
+              <a:t>When nodes or stations are connected and use a </a:t>
+            </a:r>
+            <a:r>
+              <a:rPr lang="en-US"/>
+              <a:t>common link, called </a:t>
+            </a:r>
+            <a:r>
+              <a:rPr lang="en-US" dirty="0"/>
+              <a:t>a multipoint or </a:t>
+            </a:r>
+            <a:r>
+              <a:rPr lang="en-US"/>
+              <a:t>broadcast link, </a:t>
+            </a:r>
+            <a:r>
+              <a:rPr lang="en-US" dirty="0"/>
+              <a:t>we need </a:t>
+            </a:r>
+            <a:r>
+              <a:rPr lang="en-US"/>
+              <a:t>multiple access </a:t>
+            </a:r>
+            <a:r>
+              <a:rPr lang="en-US" dirty="0"/>
+              <a:t>protocol to coordinate access to </a:t>
+            </a:r>
+            <a:r>
+              <a:rPr lang="en-US"/>
+              <a:t>the link.</a:t>
+            </a:r>
+            <a:endParaRPr lang="en-US" dirty="0"/>
           </a:p>
           <a:p>
             <a:endParaRPr lang="en-US" dirty="0"/>
@@ -19579,7 +19560,7 @@
                   </a:outerShdw>
                 </a:effectLst>
               </a:rPr>
-              <a:t> methods, no station is superior to another station and none is assigned the control over another.</a:t>
+              <a:t> methods, no station is superior to another station and none is assigned the control over another. </a:t>
             </a:r>
           </a:p>
           <a:p>
@@ -19829,7 +19810,7 @@
             </a:pPr>
             <a:r>
               <a:rPr lang="en-US" altLang="en-US" sz="2400" dirty="0"/>
-              <a:t>	If you have a packet, just send it.</a:t>
+              <a:t>If you have a packet, just send it.</a:t>
             </a:r>
           </a:p>
           <a:p>
@@ -19839,7 +19820,7 @@
             </a:pPr>
             <a:r>
               <a:rPr lang="en-US" altLang="en-US" sz="2400" dirty="0"/>
-              <a:t>	If multiple people try it and so there is collision, then try resending it later!</a:t>
+              <a:t>If multiple people try it and so there is collision, then try resending it later!</a:t>
             </a:r>
           </a:p>
           <a:p>
@@ -19849,7 +19830,7 @@
             </a:pPr>
             <a:r>
               <a:rPr lang="en-US" altLang="en-US" sz="2400" dirty="0"/>
-              <a:t>	Theoretical analysis (based on Poisson distribution) shows a throughput of only 18%.</a:t>
+              <a:t>Theoretical analysis (based on Poisson distribution) shows a throughput of only 18%.</a:t>
             </a:r>
           </a:p>
           <a:p>
@@ -20251,8 +20232,8 @@
         </p:nvSpPr>
         <p:spPr>
           <a:xfrm>
-            <a:off x="0" y="533400"/>
-            <a:ext cx="9058890" cy="5909310"/>
+            <a:off x="114300" y="228600"/>
+            <a:ext cx="8915400" cy="6001643"/>
           </a:xfrm>
           <a:prstGeom prst="rect">
             <a:avLst/>
@@ -20260,7 +20241,7 @@
           <a:noFill/>
         </p:spPr>
         <p:txBody>
-          <a:bodyPr wrap="none" rtlCol="0">
+          <a:bodyPr wrap="square" rtlCol="0">
             <a:spAutoFit/>
           </a:bodyPr>
           <a:lstStyle/>
@@ -20271,7 +20252,7 @@
             </a:pPr>
             <a:r>
               <a:rPr lang="en-US" sz="2400" dirty="0"/>
-              <a:t>Here frame 1.1 from station1 and frame 3.2 from station 3  will </a:t>
+              <a:t>Here frame 1.1 from station1 and frame 3.2 from station 3 will </a:t>
             </a:r>
           </a:p>
           <a:p>
@@ -20287,7 +20268,7 @@
             </a:pPr>
             <a:r>
               <a:rPr lang="en-US" sz="2400" dirty="0"/>
-              <a:t>So we need to resend the frame that have been destroyed </a:t>
+              <a:t>So we need to resend the frames that have been destroyed </a:t>
             </a:r>
           </a:p>
           <a:p>
@@ -20303,13 +20284,7 @@
             </a:pPr>
             <a:r>
               <a:rPr lang="en-US" sz="2400" dirty="0"/>
-              <a:t>When a station sends a frame ,it expects the receiver to send an</a:t>
-            </a:r>
-          </a:p>
-          <a:p>
-            <a:r>
-              <a:rPr lang="en-US" sz="2400" dirty="0"/>
-              <a:t> acknowledgment.</a:t>
+              <a:t>When a station sends a frame, it expects the receiver to send an acknowledgment.</a:t>
             </a:r>
           </a:p>
           <a:p>
@@ -20319,29 +20294,7 @@
             </a:pPr>
             <a:r>
               <a:rPr lang="en-US" sz="2400" dirty="0"/>
-              <a:t>If the </a:t>
-            </a:r>
-            <a:r>
-              <a:rPr lang="en-US" sz="2400" dirty="0" err="1"/>
-              <a:t>ack</a:t>
-            </a:r>
-            <a:r>
-              <a:rPr lang="en-US" sz="2400" dirty="0"/>
-              <a:t> doesn’t arrive after time out </a:t>
-            </a:r>
-            <a:r>
-              <a:rPr lang="en-US" sz="2400" dirty="0" err="1"/>
-              <a:t>period,the</a:t>
-            </a:r>
-            <a:r>
-              <a:rPr lang="en-US" sz="2400" dirty="0"/>
-              <a:t> station </a:t>
-            </a:r>
-          </a:p>
-          <a:p>
-            <a:r>
-              <a:rPr lang="en-US" sz="2400" dirty="0"/>
-              <a:t>assumes that the frame has been destroyed and resend the frame.</a:t>
+              <a:t>If the ack doesn’t arrive after time out period, the station assumes that the frame has been destroyed and resends the frame.</a:t>
             </a:r>
           </a:p>
           <a:p>
@@ -20367,20 +20320,8 @@
               <a:buChar char="•"/>
             </a:pPr>
             <a:r>
-              <a:rPr lang="en-US" sz="2400" b="1" dirty="0"/>
-              <a:t>If all these station try to resend their frames after the</a:t>
-            </a:r>
-          </a:p>
-          <a:p>
-            <a:r>
-              <a:rPr lang="en-US" sz="2400" b="1" dirty="0"/>
-              <a:t>	 timeout ,Each station waits a random amount of</a:t>
-            </a:r>
-          </a:p>
-          <a:p>
-            <a:r>
-              <a:rPr lang="en-US" sz="2400" b="1" dirty="0"/>
-              <a:t>	 time before resending its Frame.</a:t>
+              <a:rPr lang="en-US" sz="2400" dirty="0"/>
+              <a:t>If all these station try to resend their frames after the timeout, each station waits a random amount of time before resending its frame. </a:t>
             </a:r>
           </a:p>
           <a:p>
@@ -20389,7 +20330,7 @@
               <a:buChar char="•"/>
             </a:pPr>
             <a:r>
-              <a:rPr lang="en-US" sz="2400" b="1" dirty="0"/>
+              <a:rPr lang="en-US" sz="2400" dirty="0"/>
               <a:t>This randomness will help to avoid collision.</a:t>
             </a:r>
           </a:p>
@@ -20399,20 +20340,17 @@
               <a:buChar char="•"/>
             </a:pPr>
             <a:r>
-              <a:rPr lang="en-US" sz="2400" b="1" dirty="0"/>
+              <a:rPr lang="en-US" sz="2400" dirty="0"/>
               <a:t>This is called </a:t>
             </a:r>
             <a:r>
-              <a:rPr lang="en-US" sz="2400" b="1" u="sng" dirty="0"/>
+              <a:rPr lang="en-US" sz="2400" u="sng" dirty="0"/>
               <a:t>back off time</a:t>
             </a:r>
             <a:r>
-              <a:rPr lang="en-US" sz="2400" b="1" dirty="0"/>
+              <a:rPr lang="en-US" sz="2400" dirty="0"/>
               <a:t>.</a:t>
             </a:r>
-          </a:p>
-          <a:p>
-            <a:endParaRPr lang="en-US" b="1" dirty="0"/>
           </a:p>
         </p:txBody>
       </p:sp>
@@ -20484,7 +20422,7 @@
         <p:spPr>
           <a:xfrm>
             <a:off x="152400" y="826532"/>
-            <a:ext cx="8839200" cy="3046988"/>
+            <a:ext cx="8839200" cy="3416320"/>
           </a:xfrm>
           <a:prstGeom prst="rect">
             <a:avLst/>
@@ -20554,13 +20492,17 @@
             </a:pPr>
             <a:r>
               <a:rPr lang="en-US" altLang="en-US" sz="2400" dirty="0"/>
-              <a:t>Doubles the efficiency of Aloha (38% throughput)</a:t>
-            </a:r>
-          </a:p>
-          <a:p>
-            <a:r>
+              <a:t>Doubles the efficiency of Aloha (36% throughput)</a:t>
+            </a:r>
+            <a:br>
               <a:rPr lang="en-US" altLang="en-US" sz="2400" dirty="0"/>
-              <a:t>	But requires synchronization!</a:t>
+            </a:br>
+            <a:br>
+              <a:rPr lang="en-US" altLang="en-US" sz="2400" dirty="0"/>
+            </a:br>
+            <a:r>
+              <a:rPr lang="en-US" altLang="en-US" sz="2400" dirty="0"/>
+              <a:t>But requires synchronization!</a:t>
             </a:r>
           </a:p>
         </p:txBody>

</xml_diff>

<commit_message>
added assignments and resources
</commit_message>
<xml_diff>
--- a/03. Computer Networks/PPTs/2.3. MAC.pptx
+++ b/03. Computer Networks/PPTs/2.3. MAC.pptx
@@ -250,7 +250,7 @@
           <a:p>
             <a:fld id="{4EE04660-50B5-49E2-86C4-95AD9D2CC507}" type="datetimeFigureOut">
               <a:rPr lang="en-US" smtClean="0"/>
-              <a:t>3/3/2020</a:t>
+              <a:t>4/6/2020</a:t>
             </a:fld>
             <a:endParaRPr lang="en-US"/>
           </a:p>
@@ -2892,7 +2892,7 @@
             <a:fld id="{1D8BD707-D9CF-40AE-B4C6-C98DA3205C09}" type="datetimeFigureOut">
               <a:rPr lang="en-US" smtClean="0"/>
               <a:pPr/>
-              <a:t>3/3/2020</a:t>
+              <a:t>4/6/2020</a:t>
             </a:fld>
             <a:endParaRPr lang="en-US"/>
           </a:p>
@@ -3285,7 +3285,7 @@
             <a:fld id="{1D8BD707-D9CF-40AE-B4C6-C98DA3205C09}" type="datetimeFigureOut">
               <a:rPr lang="en-US" smtClean="0"/>
               <a:pPr/>
-              <a:t>3/3/2020</a:t>
+              <a:t>4/6/2020</a:t>
             </a:fld>
             <a:endParaRPr lang="en-US"/>
           </a:p>
@@ -3820,7 +3820,7 @@
             <a:fld id="{1D8BD707-D9CF-40AE-B4C6-C98DA3205C09}" type="datetimeFigureOut">
               <a:rPr lang="en-US" smtClean="0"/>
               <a:pPr/>
-              <a:t>3/3/2020</a:t>
+              <a:t>4/6/2020</a:t>
             </a:fld>
             <a:endParaRPr lang="en-US"/>
           </a:p>
@@ -3952,7 +3952,7 @@
             <a:fld id="{1D8BD707-D9CF-40AE-B4C6-C98DA3205C09}" type="datetimeFigureOut">
               <a:rPr lang="en-US" smtClean="0"/>
               <a:pPr/>
-              <a:t>3/3/2020</a:t>
+              <a:t>4/6/2020</a:t>
             </a:fld>
             <a:endParaRPr lang="en-US"/>
           </a:p>
@@ -4497,7 +4497,7 @@
             <a:fld id="{1D8BD707-D9CF-40AE-B4C6-C98DA3205C09}" type="datetimeFigureOut">
               <a:rPr lang="en-US" smtClean="0"/>
               <a:pPr/>
-              <a:t>3/3/2020</a:t>
+              <a:t>4/6/2020</a:t>
             </a:fld>
             <a:endParaRPr lang="en-US"/>
           </a:p>
@@ -4792,7 +4792,7 @@
             <a:fld id="{1D8BD707-D9CF-40AE-B4C6-C98DA3205C09}" type="datetimeFigureOut">
               <a:rPr lang="en-US" smtClean="0"/>
               <a:pPr/>
-              <a:t>3/3/2020</a:t>
+              <a:t>4/6/2020</a:t>
             </a:fld>
             <a:endParaRPr lang="en-US"/>
           </a:p>
@@ -5453,7 +5453,7 @@
             <a:fld id="{1D8BD707-D9CF-40AE-B4C6-C98DA3205C09}" type="datetimeFigureOut">
               <a:rPr lang="en-US" smtClean="0"/>
               <a:pPr/>
-              <a:t>3/3/2020</a:t>
+              <a:t>4/6/2020</a:t>
             </a:fld>
             <a:endParaRPr lang="en-US"/>
           </a:p>
@@ -5889,7 +5889,7 @@
             <a:fld id="{1D8BD707-D9CF-40AE-B4C6-C98DA3205C09}" type="datetimeFigureOut">
               <a:rPr lang="en-US" smtClean="0"/>
               <a:pPr/>
-              <a:t>3/3/2020</a:t>
+              <a:t>4/6/2020</a:t>
             </a:fld>
             <a:endParaRPr lang="en-US"/>
           </a:p>
@@ -6204,7 +6204,7 @@
             <a:fld id="{1D8BD707-D9CF-40AE-B4C6-C98DA3205C09}" type="datetimeFigureOut">
               <a:rPr lang="en-US" smtClean="0"/>
               <a:pPr/>
-              <a:t>3/3/2020</a:t>
+              <a:t>4/6/2020</a:t>
             </a:fld>
             <a:endParaRPr lang="en-US"/>
           </a:p>
@@ -6938,7 +6938,7 @@
             <a:fld id="{1D8BD707-D9CF-40AE-B4C6-C98DA3205C09}" type="datetimeFigureOut">
               <a:rPr lang="en-US" smtClean="0"/>
               <a:pPr/>
-              <a:t>3/3/2020</a:t>
+              <a:t>4/6/2020</a:t>
             </a:fld>
             <a:endParaRPr lang="en-US"/>
           </a:p>
@@ -7603,7 +7603,7 @@
             <a:fld id="{1D8BD707-D9CF-40AE-B4C6-C98DA3205C09}" type="datetimeFigureOut">
               <a:rPr lang="en-US" smtClean="0"/>
               <a:pPr/>
-              <a:t>3/3/2020</a:t>
+              <a:t>4/6/2020</a:t>
             </a:fld>
             <a:endParaRPr lang="en-US"/>
           </a:p>
@@ -7877,7 +7877,7 @@
             <a:fld id="{1D8BD707-D9CF-40AE-B4C6-C98DA3205C09}" type="datetimeFigureOut">
               <a:rPr lang="en-US" smtClean="0"/>
               <a:pPr/>
-              <a:t>3/3/2020</a:t>
+              <a:t>4/6/2020</a:t>
             </a:fld>
             <a:endParaRPr lang="en-US"/>
           </a:p>
@@ -8551,25 +8551,6 @@
       </p:grpSpPr>
       <p:sp>
         <p:nvSpPr>
-          <p:cNvPr id="3" name="Subtitle 2"/>
-          <p:cNvSpPr>
-            <a:spLocks noGrp="1"/>
-          </p:cNvSpPr>
-          <p:nvPr>
-            <p:ph type="subTitle" idx="1"/>
-          </p:nvPr>
-        </p:nvSpPr>
-        <p:spPr/>
-        <p:txBody>
-          <a:bodyPr/>
-          <a:lstStyle/>
-          <a:p>
-            <a:endParaRPr lang="en-US" dirty="0"/>
-          </a:p>
-        </p:txBody>
-      </p:sp>
-      <p:sp>
-        <p:nvSpPr>
           <p:cNvPr id="2" name="Title 1"/>
           <p:cNvSpPr>
             <a:spLocks noGrp="1"/>
@@ -11963,7 +11944,7 @@
               <a:buNone/>
             </a:pPr>
             <a:r>
-              <a:rPr lang="en-GB" altLang="en-US" sz="2400">
+              <a:rPr lang="en-GB" altLang="en-US" sz="2400" dirty="0">
                 <a:solidFill>
                   <a:srgbClr val="000000"/>
                 </a:solidFill>
@@ -14065,7 +14046,7 @@
               <a:buNone/>
             </a:pPr>
             <a:r>
-              <a:rPr lang="en-GB" altLang="en-US" sz="8000" b="1">
+              <a:rPr lang="en-GB" altLang="en-US" sz="8000" b="1" dirty="0">
                 <a:solidFill>
                   <a:srgbClr val="FFFFFF"/>
                 </a:solidFill>
@@ -17430,25 +17411,6 @@
       </p:grpSpPr>
       <p:sp>
         <p:nvSpPr>
-          <p:cNvPr id="2" name="Title 1"/>
-          <p:cNvSpPr>
-            <a:spLocks noGrp="1"/>
-          </p:cNvSpPr>
-          <p:nvPr>
-            <p:ph type="title"/>
-          </p:nvPr>
-        </p:nvSpPr>
-        <p:spPr/>
-        <p:txBody>
-          <a:bodyPr/>
-          <a:lstStyle/>
-          <a:p>
-            <a:endParaRPr lang="en-US"/>
-          </a:p>
-        </p:txBody>
-      </p:sp>
-      <p:sp>
-        <p:nvSpPr>
           <p:cNvPr id="3" name="Content Placeholder 2"/>
           <p:cNvSpPr>
             <a:spLocks noGrp="1"/>
@@ -17969,8 +17931,8 @@
         </p:nvSpPr>
         <p:spPr>
           <a:xfrm>
-            <a:off x="152400" y="685800"/>
-            <a:ext cx="8553945" cy="1477328"/>
+            <a:off x="152401" y="685800"/>
+            <a:ext cx="8534400" cy="1477328"/>
           </a:xfrm>
           <a:prstGeom prst="rect">
             <a:avLst/>
@@ -17978,46 +17940,24 @@
           <a:noFill/>
         </p:spPr>
         <p:txBody>
-          <a:bodyPr wrap="none" rtlCol="0">
+          <a:bodyPr wrap="square" rtlCol="0">
             <a:spAutoFit/>
           </a:bodyPr>
           <a:lstStyle/>
           <a:p>
             <a:r>
               <a:rPr lang="en-US" sz="2400" b="1" dirty="0"/>
-              <a:t>Poll Function(poll) :</a:t>
-            </a:r>
-          </a:p>
-          <a:p>
-            <a:r>
-              <a:rPr lang="en-US" dirty="0"/>
-              <a:t>	</a:t>
-            </a:r>
+              <a:t>Poll Function (poll) :</a:t>
+            </a:r>
+          </a:p>
+          <a:p>
+            <a:pPr marL="342900" indent="-342900">
+              <a:buFont typeface="Arial" panose="020B0604020202020204" pitchFamily="34" charset="0"/>
+              <a:buChar char="•"/>
+            </a:pPr>
             <a:r>
               <a:rPr lang="en-US" sz="2400" dirty="0"/>
-              <a:t>If primary  wants to receive </a:t>
-            </a:r>
-            <a:r>
-              <a:rPr lang="en-US" sz="2400" dirty="0" err="1"/>
-              <a:t>data,it</a:t>
-            </a:r>
-            <a:r>
-              <a:rPr lang="en-US" sz="2400" dirty="0"/>
-              <a:t> ask the </a:t>
-            </a:r>
-            <a:r>
-              <a:rPr lang="en-US" sz="2400" dirty="0" err="1"/>
-              <a:t>secondaries</a:t>
-            </a:r>
-            <a:r>
-              <a:rPr lang="en-US" sz="2400" dirty="0"/>
-              <a:t> </a:t>
-            </a:r>
-          </a:p>
-          <a:p>
-            <a:r>
-              <a:rPr lang="en-US" sz="2400" dirty="0"/>
-              <a:t>if they have anything to send.</a:t>
+              <a:t>If primary  wants to receive data, it ask the secondaries if they have anything to send.</a:t>
             </a:r>
           </a:p>
           <a:p>
@@ -18036,8 +17976,8 @@
         </p:nvSpPr>
         <p:spPr>
           <a:xfrm>
-            <a:off x="152400" y="2355273"/>
-            <a:ext cx="8518679" cy="1569660"/>
+            <a:off x="152401" y="2355273"/>
+            <a:ext cx="8153400" cy="1200329"/>
           </a:xfrm>
           <a:prstGeom prst="rect">
             <a:avLst/>
@@ -18045,7 +17985,7 @@
           <a:noFill/>
         </p:spPr>
         <p:txBody>
-          <a:bodyPr wrap="none" rtlCol="0">
+          <a:bodyPr wrap="square" rtlCol="0">
             <a:spAutoFit/>
           </a:bodyPr>
           <a:lstStyle/>
@@ -18056,23 +17996,14 @@
             </a:r>
           </a:p>
           <a:p>
-            <a:r>
-              <a:rPr lang="en-US" dirty="0"/>
-              <a:t>	</a:t>
-            </a:r>
+            <a:pPr marL="342900" indent="-342900">
+              <a:buFont typeface="Arial" panose="020B0604020202020204" pitchFamily="34" charset="0"/>
+              <a:buChar char="•"/>
+            </a:pPr>
             <a:r>
               <a:rPr lang="en-US" sz="2400" dirty="0"/>
-              <a:t>If primary wants to send data ,it tells the secondary  to </a:t>
-            </a:r>
-          </a:p>
-          <a:p>
-            <a:r>
-              <a:rPr lang="en-US" sz="2400" dirty="0"/>
-              <a:t>get ready to receive .</a:t>
-            </a:r>
-          </a:p>
-          <a:p>
-            <a:endParaRPr lang="en-US" sz="2400" dirty="0"/>
+              <a:t>If primary wants to send data, it tells the secondary to get ready to receive.</a:t>
+            </a:r>
           </a:p>
         </p:txBody>
       </p:sp>
@@ -18129,8 +18060,8 @@
         </p:blipFill>
         <p:spPr bwMode="auto">
           <a:xfrm>
-            <a:off x="122238" y="533400"/>
-            <a:ext cx="8897937" cy="5943600"/>
+            <a:off x="122238" y="152400"/>
+            <a:ext cx="8897937" cy="6324600"/>
           </a:xfrm>
           <a:prstGeom prst="rect">
             <a:avLst/>
@@ -19765,7 +19696,7 @@
         <p:spPr>
           <a:xfrm>
             <a:off x="152400" y="609600"/>
-            <a:ext cx="8763000" cy="4154984"/>
+            <a:ext cx="8763000" cy="3785652"/>
           </a:xfrm>
           <a:prstGeom prst="rect">
             <a:avLst/>
@@ -19832,12 +19763,6 @@
               <a:rPr lang="en-US" altLang="en-US" sz="2400" dirty="0"/>
               <a:t>Theoretical analysis (based on Poisson distribution) shows a throughput of only 18%.</a:t>
             </a:r>
-          </a:p>
-          <a:p>
-            <a:pPr marL="285750" indent="-285750">
-              <a:buFont typeface="Arial" panose="020B0604020202020204" pitchFamily="34" charset="0"/>
-              <a:buChar char="•"/>
-            </a:pPr>
             <a:endParaRPr lang="en-US" sz="2400" dirty="0"/>
           </a:p>
           <a:p>

</xml_diff>